<commit_message>
Gestion de Configuracion: Ajustes sobre Plan de SCM
</commit_message>
<xml_diff>
--- a/Gestion_Configuracion/Guía Básica SCM para el Proyecto.pptx
+++ b/Gestion_Configuracion/Guía Básica SCM para el Proyecto.pptx
@@ -5,15 +5,14 @@
     <p:sldMasterId id="2147483660" r:id="rId1"/>
   </p:sldMasterIdLst>
   <p:notesMasterIdLst>
-    <p:notesMasterId r:id="rId8"/>
+    <p:notesMasterId r:id="rId7"/>
   </p:notesMasterIdLst>
   <p:sldIdLst>
     <p:sldId id="256" r:id="rId2"/>
     <p:sldId id="305" r:id="rId3"/>
-    <p:sldId id="306" r:id="rId4"/>
-    <p:sldId id="307" r:id="rId5"/>
-    <p:sldId id="308" r:id="rId6"/>
-    <p:sldId id="309" r:id="rId7"/>
+    <p:sldId id="307" r:id="rId4"/>
+    <p:sldId id="308" r:id="rId5"/>
+    <p:sldId id="309" r:id="rId6"/>
   </p:sldIdLst>
   <p:sldSz cx="12192000" cy="6858000"/>
   <p:notesSz cx="6858000" cy="9144000"/>
@@ -202,7 +201,7 @@
           <a:p>
             <a:fld id="{9E1B6D27-153B-4BBE-B921-6048A6B56514}" type="datetimeFigureOut">
               <a:rPr lang="es-ES" smtClean="0"/>
-              <a:t>20/09/2014</a:t>
+              <a:t>26/09/2014</a:t>
             </a:fld>
             <a:endParaRPr lang="es-ES"/>
           </a:p>
@@ -601,7 +600,7 @@
           <a:p>
             <a:fld id="{001562E0-0EC7-4A9E-9232-A70CAFF2BAC1}" type="datetimeFigureOut">
               <a:rPr lang="es-ES" smtClean="0"/>
-              <a:t>20/09/2014</a:t>
+              <a:t>26/09/2014</a:t>
             </a:fld>
             <a:endParaRPr lang="es-ES"/>
           </a:p>
@@ -771,7 +770,7 @@
           <a:p>
             <a:fld id="{001562E0-0EC7-4A9E-9232-A70CAFF2BAC1}" type="datetimeFigureOut">
               <a:rPr lang="es-ES" smtClean="0"/>
-              <a:t>20/09/2014</a:t>
+              <a:t>26/09/2014</a:t>
             </a:fld>
             <a:endParaRPr lang="es-ES"/>
           </a:p>
@@ -951,7 +950,7 @@
           <a:p>
             <a:fld id="{001562E0-0EC7-4A9E-9232-A70CAFF2BAC1}" type="datetimeFigureOut">
               <a:rPr lang="es-ES" smtClean="0"/>
-              <a:t>20/09/2014</a:t>
+              <a:t>26/09/2014</a:t>
             </a:fld>
             <a:endParaRPr lang="es-ES"/>
           </a:p>
@@ -1121,7 +1120,7 @@
           <a:p>
             <a:fld id="{001562E0-0EC7-4A9E-9232-A70CAFF2BAC1}" type="datetimeFigureOut">
               <a:rPr lang="es-ES" smtClean="0"/>
-              <a:t>20/09/2014</a:t>
+              <a:t>26/09/2014</a:t>
             </a:fld>
             <a:endParaRPr lang="es-ES"/>
           </a:p>
@@ -1367,7 +1366,7 @@
           <a:p>
             <a:fld id="{001562E0-0EC7-4A9E-9232-A70CAFF2BAC1}" type="datetimeFigureOut">
               <a:rPr lang="es-ES" smtClean="0"/>
-              <a:t>20/09/2014</a:t>
+              <a:t>26/09/2014</a:t>
             </a:fld>
             <a:endParaRPr lang="es-ES"/>
           </a:p>
@@ -1599,7 +1598,7 @@
           <a:p>
             <a:fld id="{001562E0-0EC7-4A9E-9232-A70CAFF2BAC1}" type="datetimeFigureOut">
               <a:rPr lang="es-ES" smtClean="0"/>
-              <a:t>20/09/2014</a:t>
+              <a:t>26/09/2014</a:t>
             </a:fld>
             <a:endParaRPr lang="es-ES"/>
           </a:p>
@@ -1966,7 +1965,7 @@
           <a:p>
             <a:fld id="{001562E0-0EC7-4A9E-9232-A70CAFF2BAC1}" type="datetimeFigureOut">
               <a:rPr lang="es-ES" smtClean="0"/>
-              <a:t>20/09/2014</a:t>
+              <a:t>26/09/2014</a:t>
             </a:fld>
             <a:endParaRPr lang="es-ES"/>
           </a:p>
@@ -2084,7 +2083,7 @@
           <a:p>
             <a:fld id="{001562E0-0EC7-4A9E-9232-A70CAFF2BAC1}" type="datetimeFigureOut">
               <a:rPr lang="es-ES" smtClean="0"/>
-              <a:t>20/09/2014</a:t>
+              <a:t>26/09/2014</a:t>
             </a:fld>
             <a:endParaRPr lang="es-ES"/>
           </a:p>
@@ -2179,7 +2178,7 @@
           <a:p>
             <a:fld id="{001562E0-0EC7-4A9E-9232-A70CAFF2BAC1}" type="datetimeFigureOut">
               <a:rPr lang="es-ES" smtClean="0"/>
-              <a:t>20/09/2014</a:t>
+              <a:t>26/09/2014</a:t>
             </a:fld>
             <a:endParaRPr lang="es-ES"/>
           </a:p>
@@ -2456,7 +2455,7 @@
           <a:p>
             <a:fld id="{001562E0-0EC7-4A9E-9232-A70CAFF2BAC1}" type="datetimeFigureOut">
               <a:rPr lang="es-ES" smtClean="0"/>
-              <a:t>20/09/2014</a:t>
+              <a:t>26/09/2014</a:t>
             </a:fld>
             <a:endParaRPr lang="es-ES"/>
           </a:p>
@@ -2713,7 +2712,7 @@
           <a:p>
             <a:fld id="{001562E0-0EC7-4A9E-9232-A70CAFF2BAC1}" type="datetimeFigureOut">
               <a:rPr lang="es-ES" smtClean="0"/>
-              <a:t>20/09/2014</a:t>
+              <a:t>26/09/2014</a:t>
             </a:fld>
             <a:endParaRPr lang="es-ES"/>
           </a:p>
@@ -2911,7 +2910,7 @@
           <a:p>
             <a:fld id="{001562E0-0EC7-4A9E-9232-A70CAFF2BAC1}" type="datetimeFigureOut">
               <a:rPr lang="es-ES" smtClean="0"/>
-              <a:t>20/09/2014</a:t>
+              <a:t>26/09/2014</a:t>
             </a:fld>
             <a:endParaRPr lang="es-ES"/>
           </a:p>
@@ -3475,6 +3474,30 @@
           </a:prstGeom>
         </p:spPr>
       </p:pic>
+      <p:pic>
+        <p:nvPicPr>
+          <p:cNvPr id="6" name="Marcador de contenido 8"/>
+          <p:cNvPicPr>
+            <a:picLocks noChangeAspect="1"/>
+          </p:cNvPicPr>
+          <p:nvPr/>
+        </p:nvPicPr>
+        <p:blipFill>
+          <a:blip r:embed="rId4"/>
+          <a:stretch>
+            <a:fillRect/>
+          </a:stretch>
+        </p:blipFill>
+        <p:spPr>
+          <a:xfrm>
+            <a:off x="6750423" y="4036305"/>
+            <a:ext cx="5181600" cy="2215978"/>
+          </a:xfrm>
+          <a:prstGeom prst="rect">
+            <a:avLst/>
+          </a:prstGeom>
+        </p:spPr>
+      </p:pic>
     </p:spTree>
     <p:extLst>
       <p:ext uri="{BB962C8B-B14F-4D97-AF65-F5344CB8AC3E}">
@@ -3507,7 +3530,7 @@
       </p:grpSpPr>
       <p:sp>
         <p:nvSpPr>
-          <p:cNvPr id="4" name="Título 3"/>
+          <p:cNvPr id="5" name="Título 4"/>
           <p:cNvSpPr>
             <a:spLocks noGrp="1"/>
           </p:cNvSpPr>
@@ -3520,59 +3543,125 @@
           <a:bodyPr/>
           <a:lstStyle/>
           <a:p>
-            <a:endParaRPr lang="es-ES"/>
-          </a:p>
-        </p:txBody>
-      </p:sp>
-      <p:sp>
-        <p:nvSpPr>
-          <p:cNvPr id="5" name="Marcador de contenido 4"/>
-          <p:cNvSpPr>
-            <a:spLocks noGrp="1"/>
-          </p:cNvSpPr>
-          <p:nvPr>
-            <p:ph sz="half" idx="1"/>
-          </p:nvPr>
-        </p:nvSpPr>
-        <p:spPr/>
-        <p:txBody>
-          <a:bodyPr/>
-          <a:lstStyle/>
-          <a:p>
-            <a:endParaRPr lang="es-ES"/>
-          </a:p>
-        </p:txBody>
-      </p:sp>
-      <p:pic>
-        <p:nvPicPr>
-          <p:cNvPr id="9" name="Marcador de contenido 8"/>
-          <p:cNvPicPr>
-            <a:picLocks noGrp="1" noChangeAspect="1"/>
-          </p:cNvPicPr>
-          <p:nvPr>
-            <p:ph sz="half" idx="2"/>
-          </p:nvPr>
-        </p:nvPicPr>
-        <p:blipFill>
-          <a:blip r:embed="rId2"/>
-          <a:stretch>
-            <a:fillRect/>
-          </a:stretch>
-        </p:blipFill>
-        <p:spPr>
-          <a:xfrm>
-            <a:off x="6172200" y="2893305"/>
-            <a:ext cx="5181600" cy="2215978"/>
-          </a:xfrm>
-          <a:prstGeom prst="rect">
-            <a:avLst/>
-          </a:prstGeom>
-        </p:spPr>
-      </p:pic>
+            <a:r>
+              <a:rPr lang="es-ES" b="1" u="sng" dirty="0" smtClean="0"/>
+              <a:t>NO</a:t>
+            </a:r>
+            <a:r>
+              <a:rPr lang="es-ES" dirty="0" smtClean="0"/>
+              <a:t> haga lo siguiente</a:t>
+            </a:r>
+            <a:endParaRPr lang="es-ES" dirty="0"/>
+          </a:p>
+        </p:txBody>
+      </p:sp>
+      <p:sp>
+        <p:nvSpPr>
+          <p:cNvPr id="6" name="Marcador de contenido 5"/>
+          <p:cNvSpPr>
+            <a:spLocks noGrp="1"/>
+          </p:cNvSpPr>
+          <p:nvPr>
+            <p:ph idx="1"/>
+          </p:nvPr>
+        </p:nvSpPr>
+        <p:spPr/>
+        <p:txBody>
+          <a:bodyPr/>
+          <a:lstStyle/>
+          <a:p>
+            <a:r>
+              <a:rPr lang="en-US" dirty="0"/>
+              <a:t>commit anything that can be regenerated from other things that were committed</a:t>
+            </a:r>
+            <a:r>
+              <a:rPr lang="en-US" dirty="0" smtClean="0"/>
+              <a:t>.</a:t>
+            </a:r>
+          </a:p>
+          <a:p>
+            <a:r>
+              <a:rPr lang="es-ES" dirty="0" err="1"/>
+              <a:t>commit</a:t>
+            </a:r>
+            <a:r>
+              <a:rPr lang="es-ES" dirty="0"/>
+              <a:t> </a:t>
+            </a:r>
+            <a:r>
+              <a:rPr lang="es-ES" dirty="0" err="1"/>
+              <a:t>configuration</a:t>
+            </a:r>
+            <a:r>
+              <a:rPr lang="es-ES" dirty="0"/>
+              <a:t> </a:t>
+            </a:r>
+            <a:r>
+              <a:rPr lang="es-ES" dirty="0" smtClean="0"/>
+              <a:t>files.</a:t>
+            </a:r>
+          </a:p>
+          <a:p>
+            <a:r>
+              <a:rPr lang="en-US" dirty="0"/>
+              <a:t>use </a:t>
+            </a:r>
+            <a:r>
+              <a:rPr lang="en-US" dirty="0" err="1"/>
+              <a:t>git</a:t>
+            </a:r>
+            <a:r>
+              <a:rPr lang="en-US" dirty="0"/>
+              <a:t> as a web deployment </a:t>
+            </a:r>
+            <a:r>
+              <a:rPr lang="en-US" dirty="0" smtClean="0"/>
+              <a:t>tool.</a:t>
+            </a:r>
+          </a:p>
+          <a:p>
+            <a:r>
+              <a:rPr lang="en-US" dirty="0"/>
+              <a:t>commit large binary files (when possible</a:t>
+            </a:r>
+            <a:r>
+              <a:rPr lang="en-US" dirty="0" smtClean="0"/>
+              <a:t>).</a:t>
+            </a:r>
+          </a:p>
+          <a:p>
+            <a:r>
+              <a:rPr lang="en-US" dirty="0"/>
+              <a:t>create very large repositories (when possible</a:t>
+            </a:r>
+            <a:r>
+              <a:rPr lang="en-US" dirty="0" smtClean="0"/>
+              <a:t>).</a:t>
+            </a:r>
+          </a:p>
+          <a:p>
+            <a:r>
+              <a:rPr lang="en-US" dirty="0"/>
+              <a:t>use reset (--hard || -merge) without </a:t>
+            </a:r>
+            <a:r>
+              <a:rPr lang="en-US" dirty="0" smtClean="0"/>
+              <a:t>committing/stashing</a:t>
+            </a:r>
+          </a:p>
+          <a:p>
+            <a:r>
+              <a:rPr lang="en-US" dirty="0"/>
+              <a:t>use checkout in file mode</a:t>
+            </a:r>
+            <a:endParaRPr lang="es-ES" dirty="0"/>
+          </a:p>
+        </p:txBody>
+      </p:sp>
     </p:spTree>
     <p:extLst>
       <p:ext uri="{BB962C8B-B14F-4D97-AF65-F5344CB8AC3E}">
-        <p14:creationId xmlns:p14="http://schemas.microsoft.com/office/powerpoint/2010/main" val="2393728681"/>
+        <p14:creationId xmlns:p14="http://schemas.microsoft.com/office/powerpoint/2010/main" val="408276879"/>
       </p:ext>
     </p:extLst>
   </p:cSld>
@@ -3643,166 +3732,6 @@
           <a:p>
             <a:r>
               <a:rPr lang="en-US" dirty="0"/>
-              <a:t>commit anything that can be regenerated from other things that were committed</a:t>
-            </a:r>
-            <a:r>
-              <a:rPr lang="en-US" dirty="0" smtClean="0"/>
-              <a:t>.</a:t>
-            </a:r>
-          </a:p>
-          <a:p>
-            <a:r>
-              <a:rPr lang="es-ES" dirty="0" err="1"/>
-              <a:t>commit</a:t>
-            </a:r>
-            <a:r>
-              <a:rPr lang="es-ES" dirty="0"/>
-              <a:t> </a:t>
-            </a:r>
-            <a:r>
-              <a:rPr lang="es-ES" dirty="0" err="1"/>
-              <a:t>configuration</a:t>
-            </a:r>
-            <a:r>
-              <a:rPr lang="es-ES" dirty="0"/>
-              <a:t> </a:t>
-            </a:r>
-            <a:r>
-              <a:rPr lang="es-ES" dirty="0" smtClean="0"/>
-              <a:t>files.</a:t>
-            </a:r>
-          </a:p>
-          <a:p>
-            <a:r>
-              <a:rPr lang="en-US" dirty="0"/>
-              <a:t>use </a:t>
-            </a:r>
-            <a:r>
-              <a:rPr lang="en-US" dirty="0" err="1"/>
-              <a:t>git</a:t>
-            </a:r>
-            <a:r>
-              <a:rPr lang="en-US" dirty="0"/>
-              <a:t> as a web deployment </a:t>
-            </a:r>
-            <a:r>
-              <a:rPr lang="en-US" dirty="0" smtClean="0"/>
-              <a:t>tool.</a:t>
-            </a:r>
-          </a:p>
-          <a:p>
-            <a:r>
-              <a:rPr lang="en-US" dirty="0"/>
-              <a:t>commit large binary files (when possible</a:t>
-            </a:r>
-            <a:r>
-              <a:rPr lang="en-US" dirty="0" smtClean="0"/>
-              <a:t>).</a:t>
-            </a:r>
-          </a:p>
-          <a:p>
-            <a:r>
-              <a:rPr lang="en-US" dirty="0"/>
-              <a:t>create very large repositories (when possible</a:t>
-            </a:r>
-            <a:r>
-              <a:rPr lang="en-US" dirty="0" smtClean="0"/>
-              <a:t>).</a:t>
-            </a:r>
-          </a:p>
-          <a:p>
-            <a:r>
-              <a:rPr lang="en-US" dirty="0"/>
-              <a:t>use reset (--hard || -merge) without </a:t>
-            </a:r>
-            <a:r>
-              <a:rPr lang="en-US" dirty="0" smtClean="0"/>
-              <a:t>committing/stashing</a:t>
-            </a:r>
-          </a:p>
-          <a:p>
-            <a:r>
-              <a:rPr lang="en-US" dirty="0"/>
-              <a:t>use checkout in file mode</a:t>
-            </a:r>
-            <a:endParaRPr lang="es-ES" dirty="0"/>
-          </a:p>
-        </p:txBody>
-      </p:sp>
-    </p:spTree>
-    <p:extLst>
-      <p:ext uri="{BB962C8B-B14F-4D97-AF65-F5344CB8AC3E}">
-        <p14:creationId xmlns:p14="http://schemas.microsoft.com/office/powerpoint/2010/main" val="408276879"/>
-      </p:ext>
-    </p:extLst>
-  </p:cSld>
-  <p:clrMapOvr>
-    <a:masterClrMapping/>
-  </p:clrMapOvr>
-</p:sld>
-</file>
-
-<file path=ppt/slides/slide5.xml><?xml version="1.0" encoding="utf-8"?>
-<p:sld xmlns:a="http://schemas.openxmlformats.org/drawingml/2006/main" xmlns:r="http://schemas.openxmlformats.org/officeDocument/2006/relationships" xmlns:p="http://schemas.openxmlformats.org/presentationml/2006/main">
-  <p:cSld>
-    <p:spTree>
-      <p:nvGrpSpPr>
-        <p:cNvPr id="1" name=""/>
-        <p:cNvGrpSpPr/>
-        <p:nvPr/>
-      </p:nvGrpSpPr>
-      <p:grpSpPr>
-        <a:xfrm>
-          <a:off x="0" y="0"/>
-          <a:ext cx="0" cy="0"/>
-          <a:chOff x="0" y="0"/>
-          <a:chExt cx="0" cy="0"/>
-        </a:xfrm>
-      </p:grpSpPr>
-      <p:sp>
-        <p:nvSpPr>
-          <p:cNvPr id="5" name="Título 4"/>
-          <p:cNvSpPr>
-            <a:spLocks noGrp="1"/>
-          </p:cNvSpPr>
-          <p:nvPr>
-            <p:ph type="title"/>
-          </p:nvPr>
-        </p:nvSpPr>
-        <p:spPr/>
-        <p:txBody>
-          <a:bodyPr/>
-          <a:lstStyle/>
-          <a:p>
-            <a:r>
-              <a:rPr lang="es-ES" b="1" u="sng" dirty="0" smtClean="0"/>
-              <a:t>NO</a:t>
-            </a:r>
-            <a:r>
-              <a:rPr lang="es-ES" dirty="0" smtClean="0"/>
-              <a:t> haga lo siguiente</a:t>
-            </a:r>
-            <a:endParaRPr lang="es-ES" dirty="0"/>
-          </a:p>
-        </p:txBody>
-      </p:sp>
-      <p:sp>
-        <p:nvSpPr>
-          <p:cNvPr id="6" name="Marcador de contenido 5"/>
-          <p:cNvSpPr>
-            <a:spLocks noGrp="1"/>
-          </p:cNvSpPr>
-          <p:nvPr>
-            <p:ph idx="1"/>
-          </p:nvPr>
-        </p:nvSpPr>
-        <p:spPr/>
-        <p:txBody>
-          <a:bodyPr/>
-          <a:lstStyle/>
-          <a:p>
-            <a:r>
-              <a:rPr lang="en-US" dirty="0"/>
               <a:t>use </a:t>
             </a:r>
             <a:r>
@@ -3978,7 +3907,7 @@
 </p:sld>
 </file>
 
-<file path=ppt/slides/slide6.xml><?xml version="1.0" encoding="utf-8"?>
+<file path=ppt/slides/slide5.xml><?xml version="1.0" encoding="utf-8"?>
 <p:sld xmlns:a="http://schemas.openxmlformats.org/drawingml/2006/main" xmlns:r="http://schemas.openxmlformats.org/officeDocument/2006/relationships" xmlns:p="http://schemas.openxmlformats.org/presentationml/2006/main">
   <p:cSld>
     <p:spTree>

</xml_diff>